<commit_message>
feedback 2 implemented, figures updated
</commit_message>
<xml_diff>
--- a/writing/master-thesis/figures/badVsGoodApproach.pptx
+++ b/writing/master-thesis/figures/badVsGoodApproach.pptx
@@ -243,7 +243,7 @@
           <a:p>
             <a:fld id="{C902D55C-A005-4D33-AEF7-6A11993483F0}" type="datetimeFigureOut">
               <a:rPr lang="de-DE" smtClean="0"/>
-              <a:t>23.03.2022</a:t>
+              <a:t>02.05.2022</a:t>
             </a:fld>
             <a:endParaRPr lang="de-DE"/>
           </a:p>
@@ -413,7 +413,7 @@
           <a:p>
             <a:fld id="{C902D55C-A005-4D33-AEF7-6A11993483F0}" type="datetimeFigureOut">
               <a:rPr lang="de-DE" smtClean="0"/>
-              <a:t>23.03.2022</a:t>
+              <a:t>02.05.2022</a:t>
             </a:fld>
             <a:endParaRPr lang="de-DE"/>
           </a:p>
@@ -593,7 +593,7 @@
           <a:p>
             <a:fld id="{C902D55C-A005-4D33-AEF7-6A11993483F0}" type="datetimeFigureOut">
               <a:rPr lang="de-DE" smtClean="0"/>
-              <a:t>23.03.2022</a:t>
+              <a:t>02.05.2022</a:t>
             </a:fld>
             <a:endParaRPr lang="de-DE"/>
           </a:p>
@@ -763,7 +763,7 @@
           <a:p>
             <a:fld id="{C902D55C-A005-4D33-AEF7-6A11993483F0}" type="datetimeFigureOut">
               <a:rPr lang="de-DE" smtClean="0"/>
-              <a:t>23.03.2022</a:t>
+              <a:t>02.05.2022</a:t>
             </a:fld>
             <a:endParaRPr lang="de-DE"/>
           </a:p>
@@ -1009,7 +1009,7 @@
           <a:p>
             <a:fld id="{C902D55C-A005-4D33-AEF7-6A11993483F0}" type="datetimeFigureOut">
               <a:rPr lang="de-DE" smtClean="0"/>
-              <a:t>23.03.2022</a:t>
+              <a:t>02.05.2022</a:t>
             </a:fld>
             <a:endParaRPr lang="de-DE"/>
           </a:p>
@@ -1241,7 +1241,7 @@
           <a:p>
             <a:fld id="{C902D55C-A005-4D33-AEF7-6A11993483F0}" type="datetimeFigureOut">
               <a:rPr lang="de-DE" smtClean="0"/>
-              <a:t>23.03.2022</a:t>
+              <a:t>02.05.2022</a:t>
             </a:fld>
             <a:endParaRPr lang="de-DE"/>
           </a:p>
@@ -1608,7 +1608,7 @@
           <a:p>
             <a:fld id="{C902D55C-A005-4D33-AEF7-6A11993483F0}" type="datetimeFigureOut">
               <a:rPr lang="de-DE" smtClean="0"/>
-              <a:t>23.03.2022</a:t>
+              <a:t>02.05.2022</a:t>
             </a:fld>
             <a:endParaRPr lang="de-DE"/>
           </a:p>
@@ -1726,7 +1726,7 @@
           <a:p>
             <a:fld id="{C902D55C-A005-4D33-AEF7-6A11993483F0}" type="datetimeFigureOut">
               <a:rPr lang="de-DE" smtClean="0"/>
-              <a:t>23.03.2022</a:t>
+              <a:t>02.05.2022</a:t>
             </a:fld>
             <a:endParaRPr lang="de-DE"/>
           </a:p>
@@ -1821,7 +1821,7 @@
           <a:p>
             <a:fld id="{C902D55C-A005-4D33-AEF7-6A11993483F0}" type="datetimeFigureOut">
               <a:rPr lang="de-DE" smtClean="0"/>
-              <a:t>23.03.2022</a:t>
+              <a:t>02.05.2022</a:t>
             </a:fld>
             <a:endParaRPr lang="de-DE"/>
           </a:p>
@@ -2098,7 +2098,7 @@
           <a:p>
             <a:fld id="{C902D55C-A005-4D33-AEF7-6A11993483F0}" type="datetimeFigureOut">
               <a:rPr lang="de-DE" smtClean="0"/>
-              <a:t>23.03.2022</a:t>
+              <a:t>02.05.2022</a:t>
             </a:fld>
             <a:endParaRPr lang="de-DE"/>
           </a:p>
@@ -2355,7 +2355,7 @@
           <a:p>
             <a:fld id="{C902D55C-A005-4D33-AEF7-6A11993483F0}" type="datetimeFigureOut">
               <a:rPr lang="de-DE" smtClean="0"/>
-              <a:t>23.03.2022</a:t>
+              <a:t>02.05.2022</a:t>
             </a:fld>
             <a:endParaRPr lang="de-DE"/>
           </a:p>
@@ -2568,7 +2568,7 @@
           <a:p>
             <a:fld id="{C902D55C-A005-4D33-AEF7-6A11993483F0}" type="datetimeFigureOut">
               <a:rPr lang="de-DE" smtClean="0"/>
-              <a:t>23.03.2022</a:t>
+              <a:t>02.05.2022</a:t>
             </a:fld>
             <a:endParaRPr lang="de-DE"/>
           </a:p>
@@ -3832,7 +3832,7 @@
         </p:nvSpPr>
         <p:spPr>
           <a:xfrm>
-            <a:off x="4979485" y="1584869"/>
+            <a:off x="4465394" y="1595250"/>
             <a:ext cx="571252" cy="369332"/>
           </a:xfrm>
           <a:prstGeom prst="rect">

</xml_diff>